<commit_message>
With Frank's and Tal's updates
</commit_message>
<xml_diff>
--- a/presentations/ioam-ippm-ietf102.pptx
+++ b/presentations/ioam-ippm-ietf102.pptx
@@ -220,7 +220,7 @@
           <a:p>
             <a:fld id="{616853EC-143C-4648-8EB4-0EA15AAFE799}" type="datetimeFigureOut">
               <a:rPr lang="en-US" smtClean="0"/>
-              <a:t>7/16/18</a:t>
+              <a:t>7/17/2018</a:t>
             </a:fld>
             <a:endParaRPr lang="en-US"/>
           </a:p>
@@ -1795,7 +1795,7 @@
           <a:p>
             <a:fld id="{4FF60DEF-4CB3-DB44-B301-DFA6EBEC847B}" type="datetimeFigureOut">
               <a:rPr lang="en-US" smtClean="0"/>
-              <a:t>7/16/18</a:t>
+              <a:t>7/17/2018</a:t>
             </a:fld>
             <a:endParaRPr lang="en-US"/>
           </a:p>
@@ -1965,7 +1965,7 @@
           <a:p>
             <a:fld id="{4FF60DEF-4CB3-DB44-B301-DFA6EBEC847B}" type="datetimeFigureOut">
               <a:rPr lang="en-US" smtClean="0"/>
-              <a:t>7/16/18</a:t>
+              <a:t>7/17/2018</a:t>
             </a:fld>
             <a:endParaRPr lang="en-US"/>
           </a:p>
@@ -2145,7 +2145,7 @@
           <a:p>
             <a:fld id="{4FF60DEF-4CB3-DB44-B301-DFA6EBEC847B}" type="datetimeFigureOut">
               <a:rPr lang="en-US" smtClean="0"/>
-              <a:t>7/16/18</a:t>
+              <a:t>7/17/2018</a:t>
             </a:fld>
             <a:endParaRPr lang="en-US"/>
           </a:p>
@@ -2564,7 +2564,7 @@
               </a14:hiddenLine>
             </a:ext>
             <a:ext uri="{FAA26D3D-D897-4be2-8F04-BA451C77F1D7}">
-              <ma14:placeholderFlag xmlns:ma14="http://schemas.microsoft.com/office/mac/drawingml/2011/main" val="1"/>
+              <ma14:placeholderFlag xmlns:ma14="http://schemas.microsoft.com/office/mac/drawingml/2011/main" xmlns="" val="1"/>
             </a:ext>
           </a:extLst>
         </p:spPr>
@@ -2710,7 +2710,7 @@
           <a:p>
             <a:fld id="{4FF60DEF-4CB3-DB44-B301-DFA6EBEC847B}" type="datetimeFigureOut">
               <a:rPr lang="en-US" smtClean="0"/>
-              <a:t>7/16/18</a:t>
+              <a:t>7/17/2018</a:t>
             </a:fld>
             <a:endParaRPr lang="en-US"/>
           </a:p>
@@ -2956,7 +2956,7 @@
           <a:p>
             <a:fld id="{4FF60DEF-4CB3-DB44-B301-DFA6EBEC847B}" type="datetimeFigureOut">
               <a:rPr lang="en-US" smtClean="0"/>
-              <a:t>7/16/18</a:t>
+              <a:t>7/17/2018</a:t>
             </a:fld>
             <a:endParaRPr lang="en-US"/>
           </a:p>
@@ -3188,7 +3188,7 @@
           <a:p>
             <a:fld id="{4FF60DEF-4CB3-DB44-B301-DFA6EBEC847B}" type="datetimeFigureOut">
               <a:rPr lang="en-US" smtClean="0"/>
-              <a:t>7/16/18</a:t>
+              <a:t>7/17/2018</a:t>
             </a:fld>
             <a:endParaRPr lang="en-US"/>
           </a:p>
@@ -3555,7 +3555,7 @@
           <a:p>
             <a:fld id="{4FF60DEF-4CB3-DB44-B301-DFA6EBEC847B}" type="datetimeFigureOut">
               <a:rPr lang="en-US" smtClean="0"/>
-              <a:t>7/16/18</a:t>
+              <a:t>7/17/2018</a:t>
             </a:fld>
             <a:endParaRPr lang="en-US"/>
           </a:p>
@@ -3673,7 +3673,7 @@
           <a:p>
             <a:fld id="{4FF60DEF-4CB3-DB44-B301-DFA6EBEC847B}" type="datetimeFigureOut">
               <a:rPr lang="en-US" smtClean="0"/>
-              <a:t>7/16/18</a:t>
+              <a:t>7/17/2018</a:t>
             </a:fld>
             <a:endParaRPr lang="en-US"/>
           </a:p>
@@ -3768,7 +3768,7 @@
           <a:p>
             <a:fld id="{4FF60DEF-4CB3-DB44-B301-DFA6EBEC847B}" type="datetimeFigureOut">
               <a:rPr lang="en-US" smtClean="0"/>
-              <a:t>7/16/18</a:t>
+              <a:t>7/17/2018</a:t>
             </a:fld>
             <a:endParaRPr lang="en-US"/>
           </a:p>
@@ -4045,7 +4045,7 @@
           <a:p>
             <a:fld id="{4FF60DEF-4CB3-DB44-B301-DFA6EBEC847B}" type="datetimeFigureOut">
               <a:rPr lang="en-US" smtClean="0"/>
-              <a:t>7/16/18</a:t>
+              <a:t>7/17/2018</a:t>
             </a:fld>
             <a:endParaRPr lang="en-US"/>
           </a:p>
@@ -4298,7 +4298,7 @@
           <a:p>
             <a:fld id="{4FF60DEF-4CB3-DB44-B301-DFA6EBEC847B}" type="datetimeFigureOut">
               <a:rPr lang="en-US" smtClean="0"/>
-              <a:t>7/16/18</a:t>
+              <a:t>7/17/2018</a:t>
             </a:fld>
             <a:endParaRPr lang="en-US"/>
           </a:p>
@@ -4511,7 +4511,7 @@
           <a:p>
             <a:fld id="{4FF60DEF-4CB3-DB44-B301-DFA6EBEC847B}" type="datetimeFigureOut">
               <a:rPr lang="en-US" smtClean="0"/>
-              <a:t>7/16/18</a:t>
+              <a:t>7/17/2018</a:t>
             </a:fld>
             <a:endParaRPr lang="en-US"/>
           </a:p>
@@ -6008,11 +6008,41 @@
             <a:tbl>
               <a:tblPr/>
               <a:tblGrid>
-                <a:gridCol w="553479"/>
-                <a:gridCol w="2338405"/>
-                <a:gridCol w="1271239"/>
-                <a:gridCol w="1037063"/>
-                <a:gridCol w="5454804"/>
+                <a:gridCol w="553479">
+                  <a:extLst>
+                    <a:ext uri="{9D8B030D-6E8A-4147-A177-3AD203B41FA5}">
+                      <a16:colId xmlns:a16="http://schemas.microsoft.com/office/drawing/2014/main" val="20000"/>
+                    </a:ext>
+                  </a:extLst>
+                </a:gridCol>
+                <a:gridCol w="2338405">
+                  <a:extLst>
+                    <a:ext uri="{9D8B030D-6E8A-4147-A177-3AD203B41FA5}">
+                      <a16:colId xmlns:a16="http://schemas.microsoft.com/office/drawing/2014/main" val="20001"/>
+                    </a:ext>
+                  </a:extLst>
+                </a:gridCol>
+                <a:gridCol w="1271239">
+                  <a:extLst>
+                    <a:ext uri="{9D8B030D-6E8A-4147-A177-3AD203B41FA5}">
+                      <a16:colId xmlns:a16="http://schemas.microsoft.com/office/drawing/2014/main" val="20002"/>
+                    </a:ext>
+                  </a:extLst>
+                </a:gridCol>
+                <a:gridCol w="1037063">
+                  <a:extLst>
+                    <a:ext uri="{9D8B030D-6E8A-4147-A177-3AD203B41FA5}">
+                      <a16:colId xmlns:a16="http://schemas.microsoft.com/office/drawing/2014/main" val="20003"/>
+                    </a:ext>
+                  </a:extLst>
+                </a:gridCol>
+                <a:gridCol w="5454804">
+                  <a:extLst>
+                    <a:ext uri="{9D8B030D-6E8A-4147-A177-3AD203B41FA5}">
+                      <a16:colId xmlns:a16="http://schemas.microsoft.com/office/drawing/2014/main" val="20004"/>
+                    </a:ext>
+                  </a:extLst>
+                </a:gridCol>
               </a:tblGrid>
               <a:tr h="1142290">
                 <a:tc>
@@ -6271,6 +6301,11 @@
                     </a:lnB>
                   </a:tcPr>
                 </a:tc>
+                <a:extLst>
+                  <a:ext uri="{0D108BD9-81ED-4DB2-BD59-A6C34878D82A}">
+                    <a16:rowId xmlns:a16="http://schemas.microsoft.com/office/drawing/2014/main" val="10000"/>
+                  </a:ext>
+                </a:extLst>
               </a:tr>
               <a:tr h="1669500">
                 <a:tc>
@@ -6553,6 +6588,11 @@
                     </a:lnB>
                   </a:tcPr>
                 </a:tc>
+                <a:extLst>
+                  <a:ext uri="{0D108BD9-81ED-4DB2-BD59-A6C34878D82A}">
+                    <a16:rowId xmlns:a16="http://schemas.microsoft.com/office/drawing/2014/main" val="10001"/>
+                  </a:ext>
+                </a:extLst>
               </a:tr>
               <a:tr h="1405895">
                 <a:tc>
@@ -6805,6 +6845,11 @@
                     </a:lnB>
                   </a:tcPr>
                 </a:tc>
+                <a:extLst>
+                  <a:ext uri="{0D108BD9-81ED-4DB2-BD59-A6C34878D82A}">
+                    <a16:rowId xmlns:a16="http://schemas.microsoft.com/office/drawing/2014/main" val="10002"/>
+                  </a:ext>
+                </a:extLst>
               </a:tr>
               <a:tr h="641021">
                 <a:tc>
@@ -7060,6 +7105,11 @@
                     </a:lnB>
                   </a:tcPr>
                 </a:tc>
+                <a:extLst>
+                  <a:ext uri="{0D108BD9-81ED-4DB2-BD59-A6C34878D82A}">
+                    <a16:rowId xmlns:a16="http://schemas.microsoft.com/office/drawing/2014/main" val="10003"/>
+                  </a:ext>
+                </a:extLst>
               </a:tr>
               <a:tr h="831513">
                 <a:tc>
@@ -7297,6 +7347,11 @@
                     </a:lnB>
                   </a:tcPr>
                 </a:tc>
+                <a:extLst>
+                  <a:ext uri="{0D108BD9-81ED-4DB2-BD59-A6C34878D82A}">
+                    <a16:rowId xmlns:a16="http://schemas.microsoft.com/office/drawing/2014/main" val="10004"/>
+                  </a:ext>
+                </a:extLst>
               </a:tr>
             </a:tbl>
           </a:graphicData>
@@ -7606,10 +7661,34 @@
             <a:tbl>
               <a:tblPr/>
               <a:tblGrid>
-                <a:gridCol w="3018869"/>
-                <a:gridCol w="1281480"/>
-                <a:gridCol w="1145937"/>
-                <a:gridCol w="6173282"/>
+                <a:gridCol w="3018869">
+                  <a:extLst>
+                    <a:ext uri="{9D8B030D-6E8A-4147-A177-3AD203B41FA5}">
+                      <a16:colId xmlns:a16="http://schemas.microsoft.com/office/drawing/2014/main" val="20000"/>
+                    </a:ext>
+                  </a:extLst>
+                </a:gridCol>
+                <a:gridCol w="1281480">
+                  <a:extLst>
+                    <a:ext uri="{9D8B030D-6E8A-4147-A177-3AD203B41FA5}">
+                      <a16:colId xmlns:a16="http://schemas.microsoft.com/office/drawing/2014/main" val="20001"/>
+                    </a:ext>
+                  </a:extLst>
+                </a:gridCol>
+                <a:gridCol w="1145937">
+                  <a:extLst>
+                    <a:ext uri="{9D8B030D-6E8A-4147-A177-3AD203B41FA5}">
+                      <a16:colId xmlns:a16="http://schemas.microsoft.com/office/drawing/2014/main" val="20002"/>
+                    </a:ext>
+                  </a:extLst>
+                </a:gridCol>
+                <a:gridCol w="6173282">
+                  <a:extLst>
+                    <a:ext uri="{9D8B030D-6E8A-4147-A177-3AD203B41FA5}">
+                      <a16:colId xmlns:a16="http://schemas.microsoft.com/office/drawing/2014/main" val="20003"/>
+                    </a:ext>
+                  </a:extLst>
+                </a:gridCol>
               </a:tblGrid>
               <a:tr h="2262216">
                 <a:tc>
@@ -8000,6 +8079,11 @@
                     </a:lnB>
                   </a:tcPr>
                 </a:tc>
+                <a:extLst>
+                  <a:ext uri="{0D108BD9-81ED-4DB2-BD59-A6C34878D82A}">
+                    <a16:rowId xmlns:a16="http://schemas.microsoft.com/office/drawing/2014/main" val="10000"/>
+                  </a:ext>
+                </a:extLst>
               </a:tr>
               <a:tr h="1046394">
                 <a:tc>
@@ -8468,6 +8552,11 @@
                     </a:lnB>
                   </a:tcPr>
                 </a:tc>
+                <a:extLst>
+                  <a:ext uri="{0D108BD9-81ED-4DB2-BD59-A6C34878D82A}">
+                    <a16:rowId xmlns:a16="http://schemas.microsoft.com/office/drawing/2014/main" val="10001"/>
+                  </a:ext>
+                </a:extLst>
               </a:tr>
               <a:tr h="406648">
                 <a:tc>
@@ -8667,6 +8756,11 @@
                     </a:lnB>
                   </a:tcPr>
                 </a:tc>
+                <a:extLst>
+                  <a:ext uri="{0D108BD9-81ED-4DB2-BD59-A6C34878D82A}">
+                    <a16:rowId xmlns:a16="http://schemas.microsoft.com/office/drawing/2014/main" val="10002"/>
+                  </a:ext>
+                </a:extLst>
               </a:tr>
               <a:tr h="401444">
                 <a:tc>
@@ -8870,6 +8964,11 @@
                     </a:lnB>
                   </a:tcPr>
                 </a:tc>
+                <a:extLst>
+                  <a:ext uri="{0D108BD9-81ED-4DB2-BD59-A6C34878D82A}">
+                    <a16:rowId xmlns:a16="http://schemas.microsoft.com/office/drawing/2014/main" val="10003"/>
+                  </a:ext>
+                </a:extLst>
               </a:tr>
               <a:tr h="346844">
                 <a:tc>
@@ -9073,6 +9172,11 @@
                     </a:lnB>
                   </a:tcPr>
                 </a:tc>
+                <a:extLst>
+                  <a:ext uri="{0D108BD9-81ED-4DB2-BD59-A6C34878D82A}">
+                    <a16:rowId xmlns:a16="http://schemas.microsoft.com/office/drawing/2014/main" val="10004"/>
+                  </a:ext>
+                </a:extLst>
               </a:tr>
               <a:tr h="381547">
                 <a:tc>
@@ -9276,6 +9380,11 @@
                     </a:lnB>
                   </a:tcPr>
                 </a:tc>
+                <a:extLst>
+                  <a:ext uri="{0D108BD9-81ED-4DB2-BD59-A6C34878D82A}">
+                    <a16:rowId xmlns:a16="http://schemas.microsoft.com/office/drawing/2014/main" val="10005"/>
+                  </a:ext>
+                </a:extLst>
               </a:tr>
             </a:tbl>
           </a:graphicData>
@@ -18164,7 +18273,9 @@
         </p:nvSpPr>
         <p:spPr/>
         <p:txBody>
-          <a:bodyPr/>
+          <a:bodyPr>
+            <a:normAutofit fontScale="92500" lnSpcReduction="10000"/>
+          </a:bodyPr>
           <a:lstStyle/>
           <a:p>
             <a:pPr marL="514350" indent="-514350">
@@ -18174,14 +18285,21 @@
               <a:rPr lang="en-US" dirty="0" smtClean="0"/>
               <a:t>Layering: </a:t>
             </a:r>
-          </a:p>
-          <a:p>
-            <a:pPr marL="457200" lvl="1" indent="0">
-              <a:buNone/>
-            </a:pPr>
+            <a:endParaRPr lang="en-US" dirty="0" smtClean="0"/>
+          </a:p>
+          <a:p>
+            <a:pPr lvl="1"/>
             <a:r>
               <a:rPr lang="en-US" dirty="0" smtClean="0"/>
-              <a:t>If several encapsulation protocols (e.g., in case of tunneling) are stacked on top of each other, IOAM data-records could be present at every layer. The behavior follows the ships-in-the- night model. </a:t>
+              <a:t>If </a:t>
+            </a:r>
+            <a:r>
+              <a:rPr lang="en-US" dirty="0" smtClean="0"/>
+              <a:t>several encapsulation protocols (e.g., in case of tunneling) are stacked on top of each other, IOAM data-records could be present at every layer. The behavior follows the ships-in-the- night </a:t>
+            </a:r>
+            <a:r>
+              <a:rPr lang="en-US" dirty="0" smtClean="0"/>
+              <a:t>model</a:t>
             </a:r>
             <a:r>
               <a:rPr lang="en-US" b="1" dirty="0" smtClean="0">
@@ -18189,7 +18307,15 @@
                   <a:srgbClr val="00B050"/>
                 </a:solidFill>
               </a:rPr>
-              <a:t>model, i.e. IOAM data in one layer is independent from IOAM data in another layer. Layering allows operators to instrument the protocol layer they want to measure. The different layers could, but do not have to share the same IOAM encapsulation and </a:t>
+              <a:t>, </a:t>
+            </a:r>
+            <a:r>
+              <a:rPr lang="en-US" b="1" dirty="0" smtClean="0">
+                <a:solidFill>
+                  <a:srgbClr val="00B050"/>
+                </a:solidFill>
+              </a:rPr>
+              <a:t>i.e. IOAM data in one layer is independent from IOAM data in another layer. Layering allows operators to instrument the protocol layer they want to measure. The different layers could, but do not have to share the same IOAM encapsulation and </a:t>
             </a:r>
             <a:r>
               <a:rPr lang="en-US" b="1" dirty="0" err="1" smtClean="0">
@@ -18207,6 +18333,48 @@
               <a:rPr lang="en-US" dirty="0" smtClean="0"/>
               <a:t> </a:t>
             </a:r>
+            <a:endParaRPr lang="en-US" dirty="0" smtClean="0"/>
+          </a:p>
+          <a:p>
+            <a:pPr lvl="1"/>
+            <a:r>
+              <a:rPr lang="en-US" dirty="0" smtClean="0"/>
+              <a:t>Encapsulation drafts include RFC7605 based considerations:</a:t>
+            </a:r>
+            <a:br>
+              <a:rPr lang="en-US" dirty="0" smtClean="0"/>
+            </a:br>
+            <a:r>
+              <a:rPr lang="en-US" dirty="0" smtClean="0"/>
+              <a:t>Ensure that transit devices don’t change IOAM data in environments where UDP port numbers aren’t controlled.</a:t>
+            </a:r>
+            <a:endParaRPr lang="en-US" dirty="0" smtClean="0"/>
+          </a:p>
+          <a:p>
+            <a:pPr marL="514350" indent="-514350">
+              <a:buFont typeface="+mj-lt"/>
+              <a:buAutoNum type="arabicPeriod"/>
+            </a:pPr>
+            <a:r>
+              <a:rPr lang="en-US" dirty="0" smtClean="0"/>
+              <a:t>Security Considerations</a:t>
+            </a:r>
+            <a:endParaRPr lang="en-US" dirty="0" smtClean="0"/>
+          </a:p>
+          <a:p>
+            <a:pPr lvl="1"/>
+            <a:r>
+              <a:rPr lang="en-US" dirty="0" smtClean="0"/>
+              <a:t>Details on next slide</a:t>
+            </a:r>
+            <a:r>
+              <a:rPr lang="en-US" dirty="0" smtClean="0"/>
+              <a:t/>
+            </a:r>
+            <a:br>
+              <a:rPr lang="en-US" dirty="0" smtClean="0"/>
+            </a:br>
+            <a:endParaRPr lang="en-US" dirty="0"/>
           </a:p>
         </p:txBody>
       </p:sp>
@@ -18405,7 +18573,7 @@
     </p:spTree>
     <p:extLst>
       <p:ext uri="{BB962C8B-B14F-4D97-AF65-F5344CB8AC3E}">
-        <p14:creationId xmlns:p14="http://schemas.microsoft.com/office/powerpoint/2010/main" val="847610084"/>
+        <p14:creationId xmlns:p14="http://schemas.microsoft.com/office/powerpoint/2010/main" val="1154299018"/>
       </p:ext>
     </p:extLst>
   </p:cSld>

</xml_diff>